<commit_message>
Tweak spacing/size of logo and ignore temp files
</commit_message>
<xml_diff>
--- a/abstract_bg.pptx
+++ b/abstract_bg.pptx
@@ -351,8 +351,8 @@
         </p:nvSpPr>
         <p:spPr>
           <a:xfrm>
-            <a:off x="5290686" y="669497"/>
-            <a:ext cx="33270141" cy="2560320"/>
+            <a:off x="4946904" y="669497"/>
+            <a:ext cx="33997392" cy="2560320"/>
           </a:xfrm>
         </p:spPr>
         <p:txBody>
@@ -399,8 +399,8 @@
         </p:nvSpPr>
         <p:spPr>
           <a:xfrm>
-            <a:off x="3383280" y="3413760"/>
-            <a:ext cx="37307520" cy="1752600"/>
+            <a:off x="4946904" y="3413760"/>
+            <a:ext cx="33997392" cy="1752600"/>
           </a:xfrm>
           <a:prstGeom prst="rect">
             <a:avLst/>
@@ -1157,8 +1157,8 @@
         </p:blipFill>
         <p:spPr bwMode="auto">
           <a:xfrm>
-            <a:off x="38875811" y="309307"/>
-            <a:ext cx="4252836" cy="4810539"/>
+            <a:off x="39456360" y="512064"/>
+            <a:ext cx="3920693" cy="4434840"/>
           </a:xfrm>
           <a:prstGeom prst="rect">
             <a:avLst/>
@@ -1193,8 +1193,8 @@
         </p:nvSpPr>
         <p:spPr>
           <a:xfrm>
-            <a:off x="762000" y="356616"/>
-            <a:ext cx="4252913" cy="4809744"/>
+            <a:off x="512064" y="512064"/>
+            <a:ext cx="3922776" cy="4434840"/>
           </a:xfrm>
         </p:spPr>
         <p:txBody>
@@ -1784,7 +1784,7 @@
           <p:cNvPr id="2" name="Text Placeholder 1">
             <a:extLst>
               <a:ext uri="{FF2B5EF4-FFF2-40B4-BE49-F238E27FC236}">
-                <a16:creationId xmlns:a16="http://schemas.microsoft.com/office/drawing/2014/main" id="{D74FC38B-1A82-48D6-829B-CC1D10FBA123}"/>
+                <a16:creationId xmlns:a16="http://schemas.microsoft.com/office/drawing/2014/main" id="{C3A79E27-C36C-4790-BF4B-4535E86C9F8F}"/>
               </a:ext>
             </a:extLst>
           </p:cNvPr>
@@ -1800,7 +1800,7 @@
           <a:bodyPr/>
           <a:lstStyle/>
           <a:p>
-            <a:endParaRPr lang="en-US" dirty="0"/>
+            <a:endParaRPr lang="en-US"/>
           </a:p>
         </p:txBody>
       </p:sp>
@@ -1809,7 +1809,7 @@
           <p:cNvPr id="3" name="Text Placeholder 2">
             <a:extLst>
               <a:ext uri="{FF2B5EF4-FFF2-40B4-BE49-F238E27FC236}">
-                <a16:creationId xmlns:a16="http://schemas.microsoft.com/office/drawing/2014/main" id="{C5118F6D-F180-45CF-94D0-923907A5F8CE}"/>
+                <a16:creationId xmlns:a16="http://schemas.microsoft.com/office/drawing/2014/main" id="{B0FFEFD2-E91D-4D65-9B75-66F22B1AA443}"/>
               </a:ext>
             </a:extLst>
           </p:cNvPr>
@@ -1825,7 +1825,7 @@
           <a:bodyPr/>
           <a:lstStyle/>
           <a:p>
-            <a:endParaRPr lang="en-US" dirty="0"/>
+            <a:endParaRPr lang="en-US"/>
           </a:p>
         </p:txBody>
       </p:sp>
@@ -1834,7 +1834,7 @@
           <p:cNvPr id="4" name="Text Placeholder 3">
             <a:extLst>
               <a:ext uri="{FF2B5EF4-FFF2-40B4-BE49-F238E27FC236}">
-                <a16:creationId xmlns:a16="http://schemas.microsoft.com/office/drawing/2014/main" id="{DCABDC32-EDD0-485E-96F0-94F8AE5F595E}"/>
+                <a16:creationId xmlns:a16="http://schemas.microsoft.com/office/drawing/2014/main" id="{9E4164E3-5EEF-429E-9EBC-ECDB55C24F43}"/>
               </a:ext>
             </a:extLst>
           </p:cNvPr>
@@ -1850,7 +1850,7 @@
           <a:bodyPr/>
           <a:lstStyle/>
           <a:p>
-            <a:endParaRPr lang="en-US" dirty="0"/>
+            <a:endParaRPr lang="en-US"/>
           </a:p>
         </p:txBody>
       </p:sp>
@@ -1859,7 +1859,7 @@
           <p:cNvPr id="5" name="Title 4">
             <a:extLst>
               <a:ext uri="{FF2B5EF4-FFF2-40B4-BE49-F238E27FC236}">
-                <a16:creationId xmlns:a16="http://schemas.microsoft.com/office/drawing/2014/main" id="{4C7C5C09-36B4-4304-8DD7-59D2BBEFBD3B}"/>
+                <a16:creationId xmlns:a16="http://schemas.microsoft.com/office/drawing/2014/main" id="{8EC2A4F5-419C-436F-9533-D1566FBBBEF0}"/>
               </a:ext>
             </a:extLst>
           </p:cNvPr>
@@ -1875,7 +1875,7 @@
           <a:bodyPr/>
           <a:lstStyle/>
           <a:p>
-            <a:endParaRPr lang="en-US" dirty="0"/>
+            <a:endParaRPr lang="en-US"/>
           </a:p>
         </p:txBody>
       </p:sp>
@@ -1884,7 +1884,7 @@
           <p:cNvPr id="6" name="Text Placeholder 5">
             <a:extLst>
               <a:ext uri="{FF2B5EF4-FFF2-40B4-BE49-F238E27FC236}">
-                <a16:creationId xmlns:a16="http://schemas.microsoft.com/office/drawing/2014/main" id="{CE722B28-C022-48EB-8CBE-025485456AF3}"/>
+                <a16:creationId xmlns:a16="http://schemas.microsoft.com/office/drawing/2014/main" id="{98E7DFBC-C06C-47D7-BBF2-69F675A4F1CF}"/>
               </a:ext>
             </a:extLst>
           </p:cNvPr>
@@ -1900,7 +1900,7 @@
           <a:bodyPr/>
           <a:lstStyle/>
           <a:p>
-            <a:endParaRPr lang="en-US" dirty="0"/>
+            <a:endParaRPr lang="en-US"/>
           </a:p>
         </p:txBody>
       </p:sp>
@@ -1909,7 +1909,7 @@
           <p:cNvPr id="7" name="Text Placeholder 6">
             <a:extLst>
               <a:ext uri="{FF2B5EF4-FFF2-40B4-BE49-F238E27FC236}">
-                <a16:creationId xmlns:a16="http://schemas.microsoft.com/office/drawing/2014/main" id="{590FF063-D111-4942-992F-3FFFC7BA7565}"/>
+                <a16:creationId xmlns:a16="http://schemas.microsoft.com/office/drawing/2014/main" id="{9440C3A3-B05C-457E-84F5-A086DCAA43A0}"/>
               </a:ext>
             </a:extLst>
           </p:cNvPr>
@@ -1925,7 +1925,7 @@
           <a:bodyPr/>
           <a:lstStyle/>
           <a:p>
-            <a:endParaRPr lang="en-US" dirty="0"/>
+            <a:endParaRPr lang="en-US"/>
           </a:p>
         </p:txBody>
       </p:sp>
@@ -1934,7 +1934,7 @@
           <p:cNvPr id="8" name="Text Placeholder 7">
             <a:extLst>
               <a:ext uri="{FF2B5EF4-FFF2-40B4-BE49-F238E27FC236}">
-                <a16:creationId xmlns:a16="http://schemas.microsoft.com/office/drawing/2014/main" id="{3803BAB2-E8ED-4415-B075-20FBCA1CB188}"/>
+                <a16:creationId xmlns:a16="http://schemas.microsoft.com/office/drawing/2014/main" id="{590F034E-3E73-4F33-8874-A06ECE262574}"/>
               </a:ext>
             </a:extLst>
           </p:cNvPr>
@@ -1950,7 +1950,7 @@
           <a:bodyPr/>
           <a:lstStyle/>
           <a:p>
-            <a:endParaRPr lang="en-US" dirty="0"/>
+            <a:endParaRPr lang="en-US"/>
           </a:p>
         </p:txBody>
       </p:sp>
@@ -1959,7 +1959,7 @@
           <p:cNvPr id="9" name="Text Placeholder 8">
             <a:extLst>
               <a:ext uri="{FF2B5EF4-FFF2-40B4-BE49-F238E27FC236}">
-                <a16:creationId xmlns:a16="http://schemas.microsoft.com/office/drawing/2014/main" id="{0BB9F959-4769-44CB-92FE-B05A317C8580}"/>
+                <a16:creationId xmlns:a16="http://schemas.microsoft.com/office/drawing/2014/main" id="{F793D856-C856-49B0-9292-78478CBBD4B8}"/>
               </a:ext>
             </a:extLst>
           </p:cNvPr>
@@ -1975,7 +1975,7 @@
           <a:bodyPr/>
           <a:lstStyle/>
           <a:p>
-            <a:endParaRPr lang="en-US" dirty="0"/>
+            <a:endParaRPr lang="en-US"/>
           </a:p>
         </p:txBody>
       </p:sp>
@@ -1984,7 +1984,7 @@
           <p:cNvPr id="10" name="Text Placeholder 9">
             <a:extLst>
               <a:ext uri="{FF2B5EF4-FFF2-40B4-BE49-F238E27FC236}">
-                <a16:creationId xmlns:a16="http://schemas.microsoft.com/office/drawing/2014/main" id="{6E7757CD-04D1-47AE-B9FA-F482D1FB09C4}"/>
+                <a16:creationId xmlns:a16="http://schemas.microsoft.com/office/drawing/2014/main" id="{2199B01B-E7BB-46B6-9A93-AEB0BF8CCABA}"/>
               </a:ext>
             </a:extLst>
           </p:cNvPr>
@@ -2000,7 +2000,7 @@
           <a:bodyPr/>
           <a:lstStyle/>
           <a:p>
-            <a:endParaRPr lang="en-US" dirty="0"/>
+            <a:endParaRPr lang="en-US"/>
           </a:p>
         </p:txBody>
       </p:sp>
@@ -2009,7 +2009,7 @@
           <p:cNvPr id="11" name="Text Placeholder 10">
             <a:extLst>
               <a:ext uri="{FF2B5EF4-FFF2-40B4-BE49-F238E27FC236}">
-                <a16:creationId xmlns:a16="http://schemas.microsoft.com/office/drawing/2014/main" id="{5C58A312-C0E9-4289-B98B-234024455464}"/>
+                <a16:creationId xmlns:a16="http://schemas.microsoft.com/office/drawing/2014/main" id="{D68B580F-8B12-44CB-805F-AFEDB1AAAD44}"/>
               </a:ext>
             </a:extLst>
           </p:cNvPr>
@@ -2025,7 +2025,7 @@
           <a:bodyPr/>
           <a:lstStyle/>
           <a:p>
-            <a:endParaRPr lang="en-US" dirty="0"/>
+            <a:endParaRPr lang="en-US"/>
           </a:p>
         </p:txBody>
       </p:sp>
@@ -2034,7 +2034,7 @@
           <p:cNvPr id="12" name="Text Placeholder 11">
             <a:extLst>
               <a:ext uri="{FF2B5EF4-FFF2-40B4-BE49-F238E27FC236}">
-                <a16:creationId xmlns:a16="http://schemas.microsoft.com/office/drawing/2014/main" id="{32D30723-F4D7-4A42-8F1A-78BEC9B707E2}"/>
+                <a16:creationId xmlns:a16="http://schemas.microsoft.com/office/drawing/2014/main" id="{CD53C2E1-CE41-4360-BD21-9FDCD13F448E}"/>
               </a:ext>
             </a:extLst>
           </p:cNvPr>
@@ -2050,7 +2050,7 @@
           <a:bodyPr/>
           <a:lstStyle/>
           <a:p>
-            <a:endParaRPr lang="en-US" dirty="0"/>
+            <a:endParaRPr lang="en-US"/>
           </a:p>
         </p:txBody>
       </p:sp>
@@ -2059,7 +2059,7 @@
           <p:cNvPr id="13" name="Text Placeholder 12">
             <a:extLst>
               <a:ext uri="{FF2B5EF4-FFF2-40B4-BE49-F238E27FC236}">
-                <a16:creationId xmlns:a16="http://schemas.microsoft.com/office/drawing/2014/main" id="{42DA24B2-B3BA-4EFC-A9B4-F4633ABB44CB}"/>
+                <a16:creationId xmlns:a16="http://schemas.microsoft.com/office/drawing/2014/main" id="{B65CD154-19F5-4F97-84AC-14546F3CD85A}"/>
               </a:ext>
             </a:extLst>
           </p:cNvPr>
@@ -2075,7 +2075,7 @@
           <a:bodyPr/>
           <a:lstStyle/>
           <a:p>
-            <a:endParaRPr lang="en-US" dirty="0"/>
+            <a:endParaRPr lang="en-US"/>
           </a:p>
         </p:txBody>
       </p:sp>
@@ -2084,7 +2084,7 @@
           <p:cNvPr id="14" name="Text Placeholder 13">
             <a:extLst>
               <a:ext uri="{FF2B5EF4-FFF2-40B4-BE49-F238E27FC236}">
-                <a16:creationId xmlns:a16="http://schemas.microsoft.com/office/drawing/2014/main" id="{8D22A6A4-9B2D-4E01-BF60-418585ABF5F7}"/>
+                <a16:creationId xmlns:a16="http://schemas.microsoft.com/office/drawing/2014/main" id="{FF831191-E109-46D8-AA3C-08E1D5D5655B}"/>
               </a:ext>
             </a:extLst>
           </p:cNvPr>
@@ -2100,7 +2100,7 @@
           <a:bodyPr/>
           <a:lstStyle/>
           <a:p>
-            <a:endParaRPr lang="en-US" dirty="0"/>
+            <a:endParaRPr lang="en-US"/>
           </a:p>
         </p:txBody>
       </p:sp>
@@ -2109,7 +2109,7 @@
           <p:cNvPr id="15" name="Text Placeholder 14">
             <a:extLst>
               <a:ext uri="{FF2B5EF4-FFF2-40B4-BE49-F238E27FC236}">
-                <a16:creationId xmlns:a16="http://schemas.microsoft.com/office/drawing/2014/main" id="{C8840369-1781-4E0B-8396-F839817FC7DA}"/>
+                <a16:creationId xmlns:a16="http://schemas.microsoft.com/office/drawing/2014/main" id="{C3DC3EFA-2CA2-4650-9DC9-95E9074BFC67}"/>
               </a:ext>
             </a:extLst>
           </p:cNvPr>
@@ -2125,7 +2125,7 @@
           <a:bodyPr/>
           <a:lstStyle/>
           <a:p>
-            <a:endParaRPr lang="en-US" dirty="0"/>
+            <a:endParaRPr lang="en-US"/>
           </a:p>
         </p:txBody>
       </p:sp>
@@ -2134,7 +2134,7 @@
           <p:cNvPr id="16" name="Text Placeholder 15">
             <a:extLst>
               <a:ext uri="{FF2B5EF4-FFF2-40B4-BE49-F238E27FC236}">
-                <a16:creationId xmlns:a16="http://schemas.microsoft.com/office/drawing/2014/main" id="{54C6F19C-B4C6-453A-ACE6-7D6C0A5A5B67}"/>
+                <a16:creationId xmlns:a16="http://schemas.microsoft.com/office/drawing/2014/main" id="{0629A014-6B8C-4662-9A10-2214B1DFEE51}"/>
               </a:ext>
             </a:extLst>
           </p:cNvPr>
@@ -2150,7 +2150,7 @@
           <a:bodyPr/>
           <a:lstStyle/>
           <a:p>
-            <a:endParaRPr lang="en-US" dirty="0"/>
+            <a:endParaRPr lang="en-US"/>
           </a:p>
         </p:txBody>
       </p:sp>
@@ -2159,7 +2159,7 @@
           <p:cNvPr id="17" name="Content Placeholder 16">
             <a:extLst>
               <a:ext uri="{FF2B5EF4-FFF2-40B4-BE49-F238E27FC236}">
-                <a16:creationId xmlns:a16="http://schemas.microsoft.com/office/drawing/2014/main" id="{97BED4BF-9937-44F2-A3E6-295A313E979D}"/>
+                <a16:creationId xmlns:a16="http://schemas.microsoft.com/office/drawing/2014/main" id="{B0267582-2072-464E-9D4D-B2B7360A7BC4}"/>
               </a:ext>
             </a:extLst>
           </p:cNvPr>
@@ -2182,7 +2182,7 @@
     </p:spTree>
     <p:extLst>
       <p:ext uri="{BB962C8B-B14F-4D97-AF65-F5344CB8AC3E}">
-        <p14:creationId xmlns:p14="http://schemas.microsoft.com/office/powerpoint/2010/main" val="611094065"/>
+        <p14:creationId xmlns:p14="http://schemas.microsoft.com/office/powerpoint/2010/main" val="344076513"/>
       </p:ext>
     </p:extLst>
   </p:cSld>
@@ -2387,7 +2387,7 @@
   <a:extraClrSchemeLst/>
   <a:extLst>
     <a:ext uri="{05A4C25C-085E-4340-85A3-A5531E510DB2}">
-      <thm15:themeFamily xmlns:thm15="http://schemas.microsoft.com/office/thememl/2012/main" name="abstract_bg" id="{409E5926-072B-478B-9D28-034114146CC5}" vid="{6675E222-374F-4B3E-B990-C68A817268C0}"/>
+      <thm15:themeFamily xmlns:thm15="http://schemas.microsoft.com/office/thememl/2012/main" name="abstract_bg" id="{DA363206-8289-49C1-9E2C-7263CF09CFF2}" vid="{09FCC945-6C40-4BFD-AD18-87DE6330090A}"/>
     </a:ext>
   </a:extLst>
 </a:theme>

</xml_diff>

<commit_message>
Fix template author area
</commit_message>
<xml_diff>
--- a/abstract_bg.pptx
+++ b/abstract_bg.pptx
@@ -385,76 +385,6 @@
       </p:sp>
       <p:sp>
         <p:nvSpPr>
-          <p:cNvPr id="10" name="Title 1">
-            <a:extLst>
-              <a:ext uri="{FF2B5EF4-FFF2-40B4-BE49-F238E27FC236}">
-                <a16:creationId xmlns:a16="http://schemas.microsoft.com/office/drawing/2014/main" id="{3300D1B3-2938-4EBB-B28F-41905093D34A}"/>
-              </a:ext>
-            </a:extLst>
-          </p:cNvPr>
-          <p:cNvSpPr txBox="1">
-            <a:spLocks/>
-          </p:cNvSpPr>
-          <p:nvPr userDrawn="1"/>
-        </p:nvSpPr>
-        <p:spPr>
-          <a:xfrm>
-            <a:off x="4946904" y="3413760"/>
-            <a:ext cx="33997392" cy="1752600"/>
-          </a:xfrm>
-          <a:prstGeom prst="rect">
-            <a:avLst/>
-          </a:prstGeom>
-        </p:spPr>
-        <p:txBody>
-          <a:bodyPr vert="horz" lIns="91440" tIns="45720" rIns="91440" bIns="45720" rtlCol="0" anchor="ctr" anchorCtr="0">
-            <a:normAutofit/>
-          </a:bodyPr>
-          <a:lstStyle>
-            <a:lvl1pPr algn="ctr" defTabSz="4389120" rtl="0" eaLnBrk="1" latinLnBrk="0" hangingPunct="1">
-              <a:lnSpc>
-                <a:spcPct val="90000"/>
-              </a:lnSpc>
-              <a:spcBef>
-                <a:spcPct val="0"/>
-              </a:spcBef>
-              <a:buNone/>
-              <a:defRPr sz="9600" kern="1200">
-                <a:solidFill>
-                  <a:schemeClr val="tx1"/>
-                </a:solidFill>
-                <a:latin typeface="+mj-lt"/>
-                <a:ea typeface="+mj-ea"/>
-                <a:cs typeface="+mj-cs"/>
-              </a:defRPr>
-            </a:lvl1pPr>
-          </a:lstStyle>
-          <a:p>
-            <a:r>
-              <a:rPr lang="en-US" sz="6000" dirty="0">
-                <a:solidFill>
-                  <a:schemeClr val="bg1"/>
-                </a:solidFill>
-                <a:latin typeface="+mn-lt"/>
-              </a:rPr>
-              <a:t>Author Name(s)</a:t>
-            </a:r>
-          </a:p>
-          <a:p>
-            <a:r>
-              <a:rPr lang="en-US" sz="6000" dirty="0">
-                <a:solidFill>
-                  <a:schemeClr val="bg1"/>
-                </a:solidFill>
-                <a:latin typeface="+mn-lt"/>
-              </a:rPr>
-              <a:t>Contact information and Affiliations</a:t>
-            </a:r>
-          </a:p>
-        </p:txBody>
-      </p:sp>
-      <p:sp>
-        <p:nvSpPr>
           <p:cNvPr id="20" name="Text Placeholder 19">
             <a:extLst>
               <a:ext uri="{FF2B5EF4-FFF2-40B4-BE49-F238E27FC236}">
@@ -1216,6 +1146,98 @@
             <a:r>
               <a:rPr lang="en-US" dirty="0"/>
               <a:t>Add additional appropriate graphic/logo here</a:t>
+            </a:r>
+          </a:p>
+        </p:txBody>
+      </p:sp>
+      <p:sp>
+        <p:nvSpPr>
+          <p:cNvPr id="6" name="Text Placeholder 5">
+            <a:extLst>
+              <a:ext uri="{FF2B5EF4-FFF2-40B4-BE49-F238E27FC236}">
+                <a16:creationId xmlns:a16="http://schemas.microsoft.com/office/drawing/2014/main" id="{53F188B7-C6D1-4738-B4EC-BBEFDCC229C9}"/>
+              </a:ext>
+            </a:extLst>
+          </p:cNvPr>
+          <p:cNvSpPr>
+            <a:spLocks noGrp="1"/>
+          </p:cNvSpPr>
+          <p:nvPr>
+            <p:ph type="body" sz="quarter" idx="25" hasCustomPrompt="1"/>
+          </p:nvPr>
+        </p:nvSpPr>
+        <p:spPr>
+          <a:xfrm>
+            <a:off x="4946904" y="3380693"/>
+            <a:ext cx="33997392" cy="914400"/>
+          </a:xfrm>
+        </p:spPr>
+        <p:txBody>
+          <a:bodyPr anchor="ctr" anchorCtr="0"/>
+          <a:lstStyle>
+            <a:lvl1pPr marL="0" indent="0" algn="ctr">
+              <a:lnSpc>
+                <a:spcPct val="100000"/>
+              </a:lnSpc>
+              <a:buNone/>
+              <a:defRPr sz="6000">
+                <a:solidFill>
+                  <a:schemeClr val="bg1"/>
+                </a:solidFill>
+              </a:defRPr>
+            </a:lvl1pPr>
+          </a:lstStyle>
+          <a:p>
+            <a:pPr lvl="0"/>
+            <a:r>
+              <a:rPr lang="en-US" dirty="0"/>
+              <a:t>Author Name(s)</a:t>
+            </a:r>
+          </a:p>
+        </p:txBody>
+      </p:sp>
+      <p:sp>
+        <p:nvSpPr>
+          <p:cNvPr id="39" name="Text Placeholder 5">
+            <a:extLst>
+              <a:ext uri="{FF2B5EF4-FFF2-40B4-BE49-F238E27FC236}">
+                <a16:creationId xmlns:a16="http://schemas.microsoft.com/office/drawing/2014/main" id="{BEDC5CEC-772F-4CE6-8FEB-CEB37B70F49D}"/>
+              </a:ext>
+            </a:extLst>
+          </p:cNvPr>
+          <p:cNvSpPr>
+            <a:spLocks noGrp="1"/>
+          </p:cNvSpPr>
+          <p:nvPr>
+            <p:ph type="body" sz="quarter" idx="26" hasCustomPrompt="1"/>
+          </p:nvPr>
+        </p:nvSpPr>
+        <p:spPr>
+          <a:xfrm>
+            <a:off x="4946904" y="4404422"/>
+            <a:ext cx="33997392" cy="914400"/>
+          </a:xfrm>
+        </p:spPr>
+        <p:txBody>
+          <a:bodyPr anchor="ctr" anchorCtr="0"/>
+          <a:lstStyle>
+            <a:lvl1pPr marL="0" indent="0" algn="ctr">
+              <a:lnSpc>
+                <a:spcPct val="100000"/>
+              </a:lnSpc>
+              <a:buNone/>
+              <a:defRPr sz="6000">
+                <a:solidFill>
+                  <a:schemeClr val="bg1"/>
+                </a:solidFill>
+              </a:defRPr>
+            </a:lvl1pPr>
+          </a:lstStyle>
+          <a:p>
+            <a:pPr lvl="0"/>
+            <a:r>
+              <a:rPr lang="en-US" dirty="0"/>
+              <a:t>Contact and Affiliations</a:t>
             </a:r>
           </a:p>
         </p:txBody>
@@ -1384,7 +1406,7 @@
           <a:p>
             <a:fld id="{E695B7AD-C0E4-4106-98F1-A426950388A1}" type="datetimeFigureOut">
               <a:rPr lang="en-US" smtClean="0"/>
-              <a:t>4/11/2019</a:t>
+              <a:t>4/15/2019</a:t>
             </a:fld>
             <a:endParaRPr lang="en-US"/>
           </a:p>
@@ -1784,7 +1806,7 @@
           <p:cNvPr id="2" name="Text Placeholder 1">
             <a:extLst>
               <a:ext uri="{FF2B5EF4-FFF2-40B4-BE49-F238E27FC236}">
-                <a16:creationId xmlns:a16="http://schemas.microsoft.com/office/drawing/2014/main" id="{C3A79E27-C36C-4790-BF4B-4535E86C9F8F}"/>
+                <a16:creationId xmlns:a16="http://schemas.microsoft.com/office/drawing/2014/main" id="{A65ED08B-B775-435A-9B4F-BDA086DCE7A6}"/>
               </a:ext>
             </a:extLst>
           </p:cNvPr>
@@ -1809,7 +1831,7 @@
           <p:cNvPr id="3" name="Text Placeholder 2">
             <a:extLst>
               <a:ext uri="{FF2B5EF4-FFF2-40B4-BE49-F238E27FC236}">
-                <a16:creationId xmlns:a16="http://schemas.microsoft.com/office/drawing/2014/main" id="{B0FFEFD2-E91D-4D65-9B75-66F22B1AA443}"/>
+                <a16:creationId xmlns:a16="http://schemas.microsoft.com/office/drawing/2014/main" id="{29B455F1-3C6C-4C07-9CB2-BCAEB0D8A7B7}"/>
               </a:ext>
             </a:extLst>
           </p:cNvPr>
@@ -1834,7 +1856,7 @@
           <p:cNvPr id="4" name="Text Placeholder 3">
             <a:extLst>
               <a:ext uri="{FF2B5EF4-FFF2-40B4-BE49-F238E27FC236}">
-                <a16:creationId xmlns:a16="http://schemas.microsoft.com/office/drawing/2014/main" id="{9E4164E3-5EEF-429E-9EBC-ECDB55C24F43}"/>
+                <a16:creationId xmlns:a16="http://schemas.microsoft.com/office/drawing/2014/main" id="{A459AC47-94BC-470C-9B8A-970292C0ADD6}"/>
               </a:ext>
             </a:extLst>
           </p:cNvPr>
@@ -1859,7 +1881,7 @@
           <p:cNvPr id="5" name="Title 4">
             <a:extLst>
               <a:ext uri="{FF2B5EF4-FFF2-40B4-BE49-F238E27FC236}">
-                <a16:creationId xmlns:a16="http://schemas.microsoft.com/office/drawing/2014/main" id="{8EC2A4F5-419C-436F-9533-D1566FBBBEF0}"/>
+                <a16:creationId xmlns:a16="http://schemas.microsoft.com/office/drawing/2014/main" id="{6F7474F1-B7EB-40BD-B650-D37E0AA066A3}"/>
               </a:ext>
             </a:extLst>
           </p:cNvPr>
@@ -1884,7 +1906,7 @@
           <p:cNvPr id="6" name="Text Placeholder 5">
             <a:extLst>
               <a:ext uri="{FF2B5EF4-FFF2-40B4-BE49-F238E27FC236}">
-                <a16:creationId xmlns:a16="http://schemas.microsoft.com/office/drawing/2014/main" id="{98E7DFBC-C06C-47D7-BBF2-69F675A4F1CF}"/>
+                <a16:creationId xmlns:a16="http://schemas.microsoft.com/office/drawing/2014/main" id="{CCC8C212-9152-47EB-9021-DDD1B739EED2}"/>
               </a:ext>
             </a:extLst>
           </p:cNvPr>
@@ -1909,7 +1931,7 @@
           <p:cNvPr id="7" name="Text Placeholder 6">
             <a:extLst>
               <a:ext uri="{FF2B5EF4-FFF2-40B4-BE49-F238E27FC236}">
-                <a16:creationId xmlns:a16="http://schemas.microsoft.com/office/drawing/2014/main" id="{9440C3A3-B05C-457E-84F5-A086DCAA43A0}"/>
+                <a16:creationId xmlns:a16="http://schemas.microsoft.com/office/drawing/2014/main" id="{0F002AEE-7ABF-4F25-90D8-22D1918F982A}"/>
               </a:ext>
             </a:extLst>
           </p:cNvPr>
@@ -1934,7 +1956,7 @@
           <p:cNvPr id="8" name="Text Placeholder 7">
             <a:extLst>
               <a:ext uri="{FF2B5EF4-FFF2-40B4-BE49-F238E27FC236}">
-                <a16:creationId xmlns:a16="http://schemas.microsoft.com/office/drawing/2014/main" id="{590F034E-3E73-4F33-8874-A06ECE262574}"/>
+                <a16:creationId xmlns:a16="http://schemas.microsoft.com/office/drawing/2014/main" id="{8137AE60-4368-42C2-A299-E0F9F0B57DC5}"/>
               </a:ext>
             </a:extLst>
           </p:cNvPr>
@@ -1959,7 +1981,7 @@
           <p:cNvPr id="9" name="Text Placeholder 8">
             <a:extLst>
               <a:ext uri="{FF2B5EF4-FFF2-40B4-BE49-F238E27FC236}">
-                <a16:creationId xmlns:a16="http://schemas.microsoft.com/office/drawing/2014/main" id="{F793D856-C856-49B0-9292-78478CBBD4B8}"/>
+                <a16:creationId xmlns:a16="http://schemas.microsoft.com/office/drawing/2014/main" id="{9C535820-2B15-48C9-B0AA-9FA5E543ABF1}"/>
               </a:ext>
             </a:extLst>
           </p:cNvPr>
@@ -1984,7 +2006,7 @@
           <p:cNvPr id="10" name="Text Placeholder 9">
             <a:extLst>
               <a:ext uri="{FF2B5EF4-FFF2-40B4-BE49-F238E27FC236}">
-                <a16:creationId xmlns:a16="http://schemas.microsoft.com/office/drawing/2014/main" id="{2199B01B-E7BB-46B6-9A93-AEB0BF8CCABA}"/>
+                <a16:creationId xmlns:a16="http://schemas.microsoft.com/office/drawing/2014/main" id="{2F1AFE3A-F984-4AF2-BF89-DF5843246A7A}"/>
               </a:ext>
             </a:extLst>
           </p:cNvPr>
@@ -2009,7 +2031,7 @@
           <p:cNvPr id="11" name="Text Placeholder 10">
             <a:extLst>
               <a:ext uri="{FF2B5EF4-FFF2-40B4-BE49-F238E27FC236}">
-                <a16:creationId xmlns:a16="http://schemas.microsoft.com/office/drawing/2014/main" id="{D68B580F-8B12-44CB-805F-AFEDB1AAAD44}"/>
+                <a16:creationId xmlns:a16="http://schemas.microsoft.com/office/drawing/2014/main" id="{7DD57B1E-4D9F-47F9-88F7-FB032B9D6324}"/>
               </a:ext>
             </a:extLst>
           </p:cNvPr>
@@ -2034,7 +2056,7 @@
           <p:cNvPr id="12" name="Text Placeholder 11">
             <a:extLst>
               <a:ext uri="{FF2B5EF4-FFF2-40B4-BE49-F238E27FC236}">
-                <a16:creationId xmlns:a16="http://schemas.microsoft.com/office/drawing/2014/main" id="{CD53C2E1-CE41-4360-BD21-9FDCD13F448E}"/>
+                <a16:creationId xmlns:a16="http://schemas.microsoft.com/office/drawing/2014/main" id="{65D66D60-3409-4A83-882F-DEF1F6DDFE92}"/>
               </a:ext>
             </a:extLst>
           </p:cNvPr>
@@ -2059,7 +2081,7 @@
           <p:cNvPr id="13" name="Text Placeholder 12">
             <a:extLst>
               <a:ext uri="{FF2B5EF4-FFF2-40B4-BE49-F238E27FC236}">
-                <a16:creationId xmlns:a16="http://schemas.microsoft.com/office/drawing/2014/main" id="{B65CD154-19F5-4F97-84AC-14546F3CD85A}"/>
+                <a16:creationId xmlns:a16="http://schemas.microsoft.com/office/drawing/2014/main" id="{653E4573-0153-477E-A6EA-F369D642E8BD}"/>
               </a:ext>
             </a:extLst>
           </p:cNvPr>
@@ -2084,7 +2106,7 @@
           <p:cNvPr id="14" name="Text Placeholder 13">
             <a:extLst>
               <a:ext uri="{FF2B5EF4-FFF2-40B4-BE49-F238E27FC236}">
-                <a16:creationId xmlns:a16="http://schemas.microsoft.com/office/drawing/2014/main" id="{FF831191-E109-46D8-AA3C-08E1D5D5655B}"/>
+                <a16:creationId xmlns:a16="http://schemas.microsoft.com/office/drawing/2014/main" id="{D93257E1-88C3-4089-9BFF-38DFCEA27AC5}"/>
               </a:ext>
             </a:extLst>
           </p:cNvPr>
@@ -2109,7 +2131,7 @@
           <p:cNvPr id="15" name="Text Placeholder 14">
             <a:extLst>
               <a:ext uri="{FF2B5EF4-FFF2-40B4-BE49-F238E27FC236}">
-                <a16:creationId xmlns:a16="http://schemas.microsoft.com/office/drawing/2014/main" id="{C3DC3EFA-2CA2-4650-9DC9-95E9074BFC67}"/>
+                <a16:creationId xmlns:a16="http://schemas.microsoft.com/office/drawing/2014/main" id="{47FED097-712A-4391-BB35-7534ADE256AE}"/>
               </a:ext>
             </a:extLst>
           </p:cNvPr>
@@ -2134,7 +2156,7 @@
           <p:cNvPr id="16" name="Text Placeholder 15">
             <a:extLst>
               <a:ext uri="{FF2B5EF4-FFF2-40B4-BE49-F238E27FC236}">
-                <a16:creationId xmlns:a16="http://schemas.microsoft.com/office/drawing/2014/main" id="{0629A014-6B8C-4662-9A10-2214B1DFEE51}"/>
+                <a16:creationId xmlns:a16="http://schemas.microsoft.com/office/drawing/2014/main" id="{F7C18949-3E74-4B71-BB77-D29BCE1BA17F}"/>
               </a:ext>
             </a:extLst>
           </p:cNvPr>
@@ -2159,7 +2181,7 @@
           <p:cNvPr id="17" name="Content Placeholder 16">
             <a:extLst>
               <a:ext uri="{FF2B5EF4-FFF2-40B4-BE49-F238E27FC236}">
-                <a16:creationId xmlns:a16="http://schemas.microsoft.com/office/drawing/2014/main" id="{B0267582-2072-464E-9D4D-B2B7360A7BC4}"/>
+                <a16:creationId xmlns:a16="http://schemas.microsoft.com/office/drawing/2014/main" id="{69B1EFCA-7359-4DA1-9B95-C3CEB2B3F076}"/>
               </a:ext>
             </a:extLst>
           </p:cNvPr>
@@ -2173,6 +2195,60 @@
         <p:spPr/>
         <p:txBody>
           <a:bodyPr/>
+          <a:lstStyle/>
+          <a:p>
+            <a:endParaRPr lang="en-US"/>
+          </a:p>
+        </p:txBody>
+      </p:sp>
+      <p:sp>
+        <p:nvSpPr>
+          <p:cNvPr id="18" name="Text Placeholder 17">
+            <a:extLst>
+              <a:ext uri="{FF2B5EF4-FFF2-40B4-BE49-F238E27FC236}">
+                <a16:creationId xmlns:a16="http://schemas.microsoft.com/office/drawing/2014/main" id="{6C7A8E39-51B8-446A-A58D-E4A6958BDFE2}"/>
+              </a:ext>
+            </a:extLst>
+          </p:cNvPr>
+          <p:cNvSpPr>
+            <a:spLocks noGrp="1"/>
+          </p:cNvSpPr>
+          <p:nvPr>
+            <p:ph type="body" sz="quarter" idx="25"/>
+          </p:nvPr>
+        </p:nvSpPr>
+        <p:spPr/>
+        <p:txBody>
+          <a:bodyPr>
+            <a:normAutofit fontScale="92500" lnSpcReduction="10000"/>
+          </a:bodyPr>
+          <a:lstStyle/>
+          <a:p>
+            <a:endParaRPr lang="en-US"/>
+          </a:p>
+        </p:txBody>
+      </p:sp>
+      <p:sp>
+        <p:nvSpPr>
+          <p:cNvPr id="19" name="Text Placeholder 18">
+            <a:extLst>
+              <a:ext uri="{FF2B5EF4-FFF2-40B4-BE49-F238E27FC236}">
+                <a16:creationId xmlns:a16="http://schemas.microsoft.com/office/drawing/2014/main" id="{1230B1EE-E97C-4A5D-8EB4-FEE65881F4F4}"/>
+              </a:ext>
+            </a:extLst>
+          </p:cNvPr>
+          <p:cNvSpPr>
+            <a:spLocks noGrp="1"/>
+          </p:cNvSpPr>
+          <p:nvPr>
+            <p:ph type="body" sz="quarter" idx="26"/>
+          </p:nvPr>
+        </p:nvSpPr>
+        <p:spPr/>
+        <p:txBody>
+          <a:bodyPr>
+            <a:normAutofit fontScale="92500" lnSpcReduction="10000"/>
+          </a:bodyPr>
           <a:lstStyle/>
           <a:p>
             <a:endParaRPr lang="en-US"/>
@@ -2182,7 +2258,7 @@
     </p:spTree>
     <p:extLst>
       <p:ext uri="{BB962C8B-B14F-4D97-AF65-F5344CB8AC3E}">
-        <p14:creationId xmlns:p14="http://schemas.microsoft.com/office/powerpoint/2010/main" val="344076513"/>
+        <p14:creationId xmlns:p14="http://schemas.microsoft.com/office/powerpoint/2010/main" val="4287168507"/>
       </p:ext>
     </p:extLst>
   </p:cSld>
@@ -2387,7 +2463,7 @@
   <a:extraClrSchemeLst/>
   <a:extLst>
     <a:ext uri="{05A4C25C-085E-4340-85A3-A5531E510DB2}">
-      <thm15:themeFamily xmlns:thm15="http://schemas.microsoft.com/office/thememl/2012/main" name="abstract_bg" id="{DA363206-8289-49C1-9E2C-7263CF09CFF2}" vid="{09FCC945-6C40-4BFD-AD18-87DE6330090A}"/>
+      <thm15:themeFamily xmlns:thm15="http://schemas.microsoft.com/office/thememl/2012/main" name="abstract_bg" id="{29B32C95-BF94-4328-B440-C1461C2F0B06}" vid="{B9381D9B-251E-4F9E-BEA1-FCED3FB9D33D}"/>
     </a:ext>
   </a:extLst>
 </a:theme>

</xml_diff>